<commit_message>
Almost all of the first three parts.
</commit_message>
<xml_diff>
--- a/01. My Dataset.pptx
+++ b/01. My Dataset.pptx
@@ -6,7 +6,10 @@
   </p:sldMasterIdLst>
   <p:sldIdLst>
     <p:sldId id="256" r:id="rId2"/>
-    <p:sldId id="257" r:id="rId3"/>
+    <p:sldId id="259" r:id="rId3"/>
+    <p:sldId id="257" r:id="rId4"/>
+    <p:sldId id="258" r:id="rId5"/>
+    <p:sldId id="260" r:id="rId6"/>
   </p:sldIdLst>
   <p:sldSz cx="12192000" cy="6858000"/>
   <p:notesSz cx="6858000" cy="9144000"/>
@@ -105,6 +108,11 @@
       </a:defRPr>
     </a:lvl9pPr>
   </p:defaultTextStyle>
+  <p:extLst>
+    <p:ext uri="{EFAFB233-063F-42B5-8137-9DF3F51BA10A}">
+      <p15:sldGuideLst xmlns:p15="http://schemas.microsoft.com/office/powerpoint/2012/main"/>
+    </p:ext>
+  </p:extLst>
 </p:presentation>
 </file>
 
@@ -14322,7 +14330,7 @@
           <a:p>
             <a:r>
               <a:rPr lang="en-US" dirty="0"/>
-              <a:t>Statistical Question / Hypothesis</a:t>
+              <a:t>01. Statistical Question / Hypothesis</a:t>
             </a:r>
             <a:endParaRPr lang="en-GB" dirty="0"/>
           </a:p>
@@ -14442,7 +14450,772 @@
     </p:spTree>
     <p:extLst>
       <p:ext uri="{BB962C8B-B14F-4D97-AF65-F5344CB8AC3E}">
+        <p14:creationId xmlns:p14="http://schemas.microsoft.com/office/powerpoint/2010/main" val="1031633754"/>
+      </p:ext>
+    </p:extLst>
+  </p:cSld>
+  <p:clrMapOvr>
+    <a:masterClrMapping/>
+  </p:clrMapOvr>
+</p:sld>
+</file>
+
+<file path=ppt/slides/slide3.xml><?xml version="1.0" encoding="utf-8"?>
+<p:sld xmlns:a="http://schemas.openxmlformats.org/drawingml/2006/main" xmlns:r="http://schemas.openxmlformats.org/officeDocument/2006/relationships" xmlns:p="http://schemas.openxmlformats.org/presentationml/2006/main">
+  <p:cSld>
+    <p:spTree>
+      <p:nvGrpSpPr>
+        <p:cNvPr id="1" name=""/>
+        <p:cNvGrpSpPr/>
+        <p:nvPr/>
+      </p:nvGrpSpPr>
+      <p:grpSpPr>
+        <a:xfrm>
+          <a:off x="0" y="0"/>
+          <a:ext cx="0" cy="0"/>
+          <a:chOff x="0" y="0"/>
+          <a:chExt cx="0" cy="0"/>
+        </a:xfrm>
+      </p:grpSpPr>
+      <p:sp>
+        <p:nvSpPr>
+          <p:cNvPr id="2" name="Title 1">
+            <a:extLst>
+              <a:ext uri="{FF2B5EF4-FFF2-40B4-BE49-F238E27FC236}">
+                <a16:creationId xmlns:a16="http://schemas.microsoft.com/office/drawing/2014/main" id="{85935A8D-C451-42F2-93A6-274F2A6A9544}"/>
+              </a:ext>
+            </a:extLst>
+          </p:cNvPr>
+          <p:cNvSpPr>
+            <a:spLocks noGrp="1"/>
+          </p:cNvSpPr>
+          <p:nvPr>
+            <p:ph type="title"/>
+          </p:nvPr>
+        </p:nvSpPr>
+        <p:spPr>
+          <a:xfrm>
+            <a:off x="731520" y="1704970"/>
+            <a:ext cx="3831771" cy="2830286"/>
+          </a:xfrm>
+        </p:spPr>
+        <p:txBody>
+          <a:bodyPr/>
+          <a:lstStyle/>
+          <a:p>
+            <a:r>
+              <a:rPr lang="en-GB" dirty="0"/>
+              <a:t>02. A minimum of 5 variables in your dataset used during your analysis. Consider what you think could have an impact on your question.</a:t>
+            </a:r>
+          </a:p>
+        </p:txBody>
+      </p:sp>
+      <p:sp>
+        <p:nvSpPr>
+          <p:cNvPr id="10" name="Content Placeholder 2">
+            <a:extLst>
+              <a:ext uri="{FF2B5EF4-FFF2-40B4-BE49-F238E27FC236}">
+                <a16:creationId xmlns:a16="http://schemas.microsoft.com/office/drawing/2014/main" id="{2DD891EF-146F-42DC-AEB4-609C6AA0CFEB}"/>
+              </a:ext>
+            </a:extLst>
+          </p:cNvPr>
+          <p:cNvSpPr>
+            <a:spLocks noGrp="1"/>
+          </p:cNvSpPr>
+          <p:nvPr>
+            <p:ph idx="1"/>
+          </p:nvPr>
+        </p:nvSpPr>
+        <p:spPr>
+          <a:xfrm>
+            <a:off x="5024846" y="1473926"/>
+            <a:ext cx="6888480" cy="4572000"/>
+          </a:xfrm>
+        </p:spPr>
+        <p:txBody>
+          <a:bodyPr>
+            <a:normAutofit fontScale="92500" lnSpcReduction="10000"/>
+          </a:bodyPr>
+          <a:lstStyle/>
+          <a:p>
+            <a:r>
+              <a:rPr lang="en-US" dirty="0">
+                <a:latin typeface="Courier New" panose="02070309020205020404" pitchFamily="49" charset="0"/>
+                <a:cs typeface="Courier New" panose="02070309020205020404" pitchFamily="49" charset="0"/>
+              </a:rPr>
+              <a:t>type</a:t>
+            </a:r>
+            <a:r>
+              <a:rPr lang="en-US" dirty="0"/>
+              <a:t> – this specifies the type of activity; there are 14 categories including ‘</a:t>
+            </a:r>
+            <a:r>
+              <a:rPr lang="en-US" dirty="0" err="1"/>
+              <a:t>VirtualRide</a:t>
+            </a:r>
+            <a:r>
+              <a:rPr lang="en-US" dirty="0"/>
+              <a:t>’, ‘Ride’, ‘Run’, and ‘Swim’</a:t>
+            </a:r>
+          </a:p>
+          <a:p>
+            <a:r>
+              <a:rPr lang="en-US" dirty="0" err="1">
+                <a:latin typeface="Courier New" panose="02070309020205020404" pitchFamily="49" charset="0"/>
+                <a:cs typeface="Courier New" panose="02070309020205020404" pitchFamily="49" charset="0"/>
+              </a:rPr>
+              <a:t>distance_mi</a:t>
+            </a:r>
+            <a:r>
+              <a:rPr lang="en-US" dirty="0"/>
+              <a:t> – the distance traveled in miles</a:t>
+            </a:r>
+          </a:p>
+          <a:p>
+            <a:r>
+              <a:rPr lang="en-US" dirty="0" err="1">
+                <a:latin typeface="Courier New" panose="02070309020205020404" pitchFamily="49" charset="0"/>
+                <a:cs typeface="Courier New" panose="02070309020205020404" pitchFamily="49" charset="0"/>
+              </a:rPr>
+              <a:t>moving_time</a:t>
+            </a:r>
+            <a:r>
+              <a:rPr lang="en-US" dirty="0"/>
+              <a:t> – the number of minutes moving (versus elapsed)</a:t>
+            </a:r>
+          </a:p>
+          <a:p>
+            <a:r>
+              <a:rPr lang="en-US" dirty="0" err="1">
+                <a:latin typeface="Courier New" panose="02070309020205020404" pitchFamily="49" charset="0"/>
+                <a:cs typeface="Courier New" panose="02070309020205020404" pitchFamily="49" charset="0"/>
+              </a:rPr>
+              <a:t>total_elevation_gain</a:t>
+            </a:r>
+            <a:r>
+              <a:rPr lang="en-US" dirty="0">
+                <a:latin typeface="Courier New" panose="02070309020205020404" pitchFamily="49" charset="0"/>
+                <a:cs typeface="Courier New" panose="02070309020205020404" pitchFamily="49" charset="0"/>
+              </a:rPr>
+              <a:t> </a:t>
+            </a:r>
+            <a:r>
+              <a:rPr lang="en-US" dirty="0"/>
+              <a:t>– the amount of climbing (in feet) for an activity</a:t>
+            </a:r>
+          </a:p>
+          <a:p>
+            <a:r>
+              <a:rPr lang="en-US" dirty="0" err="1">
+                <a:latin typeface="Courier New" panose="02070309020205020404" pitchFamily="49" charset="0"/>
+                <a:cs typeface="Courier New" panose="02070309020205020404" pitchFamily="49" charset="0"/>
+              </a:rPr>
+              <a:t>gear_id</a:t>
+            </a:r>
+            <a:r>
+              <a:rPr lang="en-US" dirty="0">
+                <a:latin typeface="Courier New" panose="02070309020205020404" pitchFamily="49" charset="0"/>
+                <a:cs typeface="Courier New" panose="02070309020205020404" pitchFamily="49" charset="0"/>
+              </a:rPr>
+              <a:t> </a:t>
+            </a:r>
+            <a:r>
+              <a:rPr lang="en-US" dirty="0"/>
+              <a:t>– the gear used (e.g., which bike or running shoe)</a:t>
+            </a:r>
+          </a:p>
+          <a:p>
+            <a:r>
+              <a:rPr lang="en-US" dirty="0" err="1">
+                <a:latin typeface="Courier New" panose="02070309020205020404" pitchFamily="49" charset="0"/>
+                <a:cs typeface="Courier New" panose="02070309020205020404" pitchFamily="49" charset="0"/>
+              </a:rPr>
+              <a:t>avg_speed_mph</a:t>
+            </a:r>
+            <a:r>
+              <a:rPr lang="en-US" dirty="0">
+                <a:latin typeface="Courier New" panose="02070309020205020404" pitchFamily="49" charset="0"/>
+                <a:cs typeface="Courier New" panose="02070309020205020404" pitchFamily="49" charset="0"/>
+              </a:rPr>
+              <a:t> </a:t>
+            </a:r>
+            <a:r>
+              <a:rPr lang="en-US" dirty="0"/>
+              <a:t>– the average speed for a given activity</a:t>
+            </a:r>
+          </a:p>
+          <a:p>
+            <a:r>
+              <a:rPr lang="en-US" dirty="0" err="1">
+                <a:latin typeface="Courier New" panose="02070309020205020404" pitchFamily="49" charset="0"/>
+                <a:cs typeface="Courier New" panose="02070309020205020404" pitchFamily="49" charset="0"/>
+              </a:rPr>
+              <a:t>average_watts</a:t>
+            </a:r>
+            <a:r>
+              <a:rPr lang="en-US" dirty="0">
+                <a:latin typeface="Courier New" panose="02070309020205020404" pitchFamily="49" charset="0"/>
+                <a:cs typeface="Courier New" panose="02070309020205020404" pitchFamily="49" charset="0"/>
+              </a:rPr>
+              <a:t> </a:t>
+            </a:r>
+            <a:r>
+              <a:rPr lang="en-US" dirty="0"/>
+              <a:t>– for cycling, the average power produced for a given activity, measured in watts</a:t>
+            </a:r>
+          </a:p>
+          <a:p>
+            <a:r>
+              <a:rPr lang="en-US" dirty="0" err="1">
+                <a:latin typeface="Courier New" panose="02070309020205020404" pitchFamily="49" charset="0"/>
+                <a:cs typeface="Courier New" panose="02070309020205020404" pitchFamily="49" charset="0"/>
+              </a:rPr>
+              <a:t>average_heartrate</a:t>
+            </a:r>
+            <a:r>
+              <a:rPr lang="en-US" dirty="0">
+                <a:latin typeface="Courier New" panose="02070309020205020404" pitchFamily="49" charset="0"/>
+                <a:cs typeface="Courier New" panose="02070309020205020404" pitchFamily="49" charset="0"/>
+              </a:rPr>
+              <a:t> </a:t>
+            </a:r>
+            <a:r>
+              <a:rPr lang="en-US" dirty="0"/>
+              <a:t>– how fast my heart was beating on average</a:t>
+            </a:r>
+          </a:p>
+          <a:p>
+            <a:r>
+              <a:rPr lang="en-US" dirty="0" err="1">
+                <a:latin typeface="Courier New" panose="02070309020205020404" pitchFamily="49" charset="0"/>
+                <a:cs typeface="Courier New" panose="02070309020205020404" pitchFamily="49" charset="0"/>
+              </a:rPr>
+              <a:t>average_temperature</a:t>
+            </a:r>
+            <a:r>
+              <a:rPr lang="en-US" dirty="0">
+                <a:latin typeface="Courier New" panose="02070309020205020404" pitchFamily="49" charset="0"/>
+                <a:cs typeface="Courier New" panose="02070309020205020404" pitchFamily="49" charset="0"/>
+              </a:rPr>
+              <a:t> </a:t>
+            </a:r>
+            <a:r>
+              <a:rPr lang="en-US" dirty="0"/>
+              <a:t>– in degrees Celsius</a:t>
+            </a:r>
+            <a:endParaRPr lang="en-GB" dirty="0"/>
+          </a:p>
+        </p:txBody>
+      </p:sp>
+    </p:spTree>
+    <p:extLst>
+      <p:ext uri="{BB962C8B-B14F-4D97-AF65-F5344CB8AC3E}">
         <p14:creationId xmlns:p14="http://schemas.microsoft.com/office/powerpoint/2010/main" val="3927870238"/>
+      </p:ext>
+    </p:extLst>
+  </p:cSld>
+  <p:clrMapOvr>
+    <a:masterClrMapping/>
+  </p:clrMapOvr>
+</p:sld>
+</file>
+
+<file path=ppt/slides/slide4.xml><?xml version="1.0" encoding="utf-8"?>
+<p:sld xmlns:a="http://schemas.openxmlformats.org/drawingml/2006/main" xmlns:r="http://schemas.openxmlformats.org/officeDocument/2006/relationships" xmlns:p="http://schemas.openxmlformats.org/presentationml/2006/main">
+  <p:cSld>
+    <p:spTree>
+      <p:nvGrpSpPr>
+        <p:cNvPr id="1" name=""/>
+        <p:cNvGrpSpPr/>
+        <p:nvPr/>
+      </p:nvGrpSpPr>
+      <p:grpSpPr>
+        <a:xfrm>
+          <a:off x="0" y="0"/>
+          <a:ext cx="0" cy="0"/>
+          <a:chOff x="0" y="0"/>
+          <a:chExt cx="0" cy="0"/>
+        </a:xfrm>
+      </p:grpSpPr>
+      <p:sp>
+        <p:nvSpPr>
+          <p:cNvPr id="2" name="Title 1">
+            <a:extLst>
+              <a:ext uri="{FF2B5EF4-FFF2-40B4-BE49-F238E27FC236}">
+                <a16:creationId xmlns:a16="http://schemas.microsoft.com/office/drawing/2014/main" id="{38B28AF3-F334-46F3-B99C-0712C5569116}"/>
+              </a:ext>
+            </a:extLst>
+          </p:cNvPr>
+          <p:cNvSpPr>
+            <a:spLocks noGrp="1"/>
+          </p:cNvSpPr>
+          <p:nvPr>
+            <p:ph type="title"/>
+          </p:nvPr>
+        </p:nvSpPr>
+        <p:spPr/>
+        <p:txBody>
+          <a:bodyPr/>
+          <a:lstStyle/>
+          <a:p>
+            <a:r>
+              <a:rPr lang="en-GB" dirty="0"/>
+              <a:t>Include a histogram of each of the variables.</a:t>
+            </a:r>
+          </a:p>
+        </p:txBody>
+      </p:sp>
+      <p:sp>
+        <p:nvSpPr>
+          <p:cNvPr id="4" name="Text Placeholder 3">
+            <a:extLst>
+              <a:ext uri="{FF2B5EF4-FFF2-40B4-BE49-F238E27FC236}">
+                <a16:creationId xmlns:a16="http://schemas.microsoft.com/office/drawing/2014/main" id="{8EC8C3A8-2D0C-48B1-BD19-F553D83CC084}"/>
+              </a:ext>
+            </a:extLst>
+          </p:cNvPr>
+          <p:cNvSpPr>
+            <a:spLocks noGrp="1"/>
+          </p:cNvSpPr>
+          <p:nvPr>
+            <p:ph type="body" sz="half" idx="2"/>
+          </p:nvPr>
+        </p:nvSpPr>
+        <p:spPr/>
+        <p:txBody>
+          <a:bodyPr/>
+          <a:lstStyle/>
+          <a:p>
+            <a:r>
+              <a:rPr lang="en-GB" dirty="0"/>
+              <a:t>In your summary and analysis, identify any outliers and explain the reasoning for them being outliers and how you believe they should be handled.</a:t>
+            </a:r>
+          </a:p>
+        </p:txBody>
+      </p:sp>
+      <p:pic>
+        <p:nvPicPr>
+          <p:cNvPr id="5" name="Picture 4">
+            <a:extLst>
+              <a:ext uri="{FF2B5EF4-FFF2-40B4-BE49-F238E27FC236}">
+                <a16:creationId xmlns:a16="http://schemas.microsoft.com/office/drawing/2014/main" id="{2E3D1890-245A-4545-8CFA-9251C42381DF}"/>
+              </a:ext>
+            </a:extLst>
+          </p:cNvPr>
+          <p:cNvPicPr>
+            <a:picLocks noChangeAspect="1"/>
+          </p:cNvPicPr>
+          <p:nvPr/>
+        </p:nvPicPr>
+        <p:blipFill>
+          <a:blip r:embed="rId2"/>
+          <a:stretch>
+            <a:fillRect/>
+          </a:stretch>
+        </p:blipFill>
+        <p:spPr>
+          <a:xfrm>
+            <a:off x="5114925" y="556247"/>
+            <a:ext cx="2343150" cy="1838137"/>
+          </a:xfrm>
+          <a:prstGeom prst="rect">
+            <a:avLst/>
+          </a:prstGeom>
+        </p:spPr>
+      </p:pic>
+      <p:pic>
+        <p:nvPicPr>
+          <p:cNvPr id="6" name="Picture 5">
+            <a:extLst>
+              <a:ext uri="{FF2B5EF4-FFF2-40B4-BE49-F238E27FC236}">
+                <a16:creationId xmlns:a16="http://schemas.microsoft.com/office/drawing/2014/main" id="{FF746228-7B63-40DA-A35F-D4829FAEEB4C}"/>
+              </a:ext>
+            </a:extLst>
+          </p:cNvPr>
+          <p:cNvPicPr>
+            <a:picLocks noChangeAspect="1"/>
+          </p:cNvPicPr>
+          <p:nvPr/>
+        </p:nvPicPr>
+        <p:blipFill>
+          <a:blip r:embed="rId3"/>
+          <a:stretch>
+            <a:fillRect/>
+          </a:stretch>
+        </p:blipFill>
+        <p:spPr>
+          <a:xfrm>
+            <a:off x="7945214" y="530119"/>
+            <a:ext cx="2356306" cy="1838137"/>
+          </a:xfrm>
+          <a:prstGeom prst="rect">
+            <a:avLst/>
+          </a:prstGeom>
+        </p:spPr>
+      </p:pic>
+      <p:sp>
+        <p:nvSpPr>
+          <p:cNvPr id="7" name="Oval 6">
+            <a:extLst>
+              <a:ext uri="{FF2B5EF4-FFF2-40B4-BE49-F238E27FC236}">
+                <a16:creationId xmlns:a16="http://schemas.microsoft.com/office/drawing/2014/main" id="{68A582BD-1717-428A-97F5-C10A1761C41F}"/>
+              </a:ext>
+            </a:extLst>
+          </p:cNvPr>
+          <p:cNvSpPr/>
+          <p:nvPr/>
+        </p:nvSpPr>
+        <p:spPr>
+          <a:xfrm>
+            <a:off x="9736732" y="1942012"/>
+            <a:ext cx="531223" cy="469790"/>
+          </a:xfrm>
+          <a:prstGeom prst="ellipse">
+            <a:avLst/>
+          </a:prstGeom>
+          <a:noFill/>
+          <a:ln>
+            <a:solidFill>
+              <a:srgbClr val="FF0000"/>
+            </a:solidFill>
+          </a:ln>
+        </p:spPr>
+        <p:style>
+          <a:lnRef idx="2">
+            <a:schemeClr val="accent1">
+              <a:shade val="50000"/>
+            </a:schemeClr>
+          </a:lnRef>
+          <a:fillRef idx="1">
+            <a:schemeClr val="accent1"/>
+          </a:fillRef>
+          <a:effectRef idx="0">
+            <a:schemeClr val="accent1"/>
+          </a:effectRef>
+          <a:fontRef idx="minor">
+            <a:schemeClr val="lt1"/>
+          </a:fontRef>
+        </p:style>
+        <p:txBody>
+          <a:bodyPr rtlCol="0" anchor="ctr"/>
+          <a:lstStyle/>
+          <a:p>
+            <a:pPr algn="ctr"/>
+            <a:endParaRPr lang="en-GB"/>
+          </a:p>
+        </p:txBody>
+      </p:sp>
+      <p:sp>
+        <p:nvSpPr>
+          <p:cNvPr id="8" name="Oval 7">
+            <a:extLst>
+              <a:ext uri="{FF2B5EF4-FFF2-40B4-BE49-F238E27FC236}">
+                <a16:creationId xmlns:a16="http://schemas.microsoft.com/office/drawing/2014/main" id="{7AD8329B-D5AE-435C-9568-E9E37AE09DA5}"/>
+              </a:ext>
+            </a:extLst>
+          </p:cNvPr>
+          <p:cNvSpPr/>
+          <p:nvPr/>
+        </p:nvSpPr>
+        <p:spPr>
+          <a:xfrm>
+            <a:off x="6997334" y="1955073"/>
+            <a:ext cx="531223" cy="469790"/>
+          </a:xfrm>
+          <a:prstGeom prst="ellipse">
+            <a:avLst/>
+          </a:prstGeom>
+          <a:noFill/>
+          <a:ln>
+            <a:solidFill>
+              <a:srgbClr val="FF0000"/>
+            </a:solidFill>
+          </a:ln>
+        </p:spPr>
+        <p:style>
+          <a:lnRef idx="2">
+            <a:schemeClr val="accent1">
+              <a:shade val="50000"/>
+            </a:schemeClr>
+          </a:lnRef>
+          <a:fillRef idx="1">
+            <a:schemeClr val="accent1"/>
+          </a:fillRef>
+          <a:effectRef idx="0">
+            <a:schemeClr val="accent1"/>
+          </a:effectRef>
+          <a:fontRef idx="minor">
+            <a:schemeClr val="lt1"/>
+          </a:fontRef>
+        </p:style>
+        <p:txBody>
+          <a:bodyPr rtlCol="0" anchor="ctr"/>
+          <a:lstStyle/>
+          <a:p>
+            <a:pPr algn="ctr"/>
+            <a:endParaRPr lang="en-GB"/>
+          </a:p>
+        </p:txBody>
+      </p:sp>
+      <p:pic>
+        <p:nvPicPr>
+          <p:cNvPr id="9" name="Picture 8">
+            <a:extLst>
+              <a:ext uri="{FF2B5EF4-FFF2-40B4-BE49-F238E27FC236}">
+                <a16:creationId xmlns:a16="http://schemas.microsoft.com/office/drawing/2014/main" id="{739D0F0C-1F6D-49BA-BB69-3DA20FFF106C}"/>
+              </a:ext>
+            </a:extLst>
+          </p:cNvPr>
+          <p:cNvPicPr>
+            <a:picLocks noChangeAspect="1"/>
+          </p:cNvPicPr>
+          <p:nvPr/>
+        </p:nvPicPr>
+        <p:blipFill>
+          <a:blip r:embed="rId4"/>
+          <a:stretch>
+            <a:fillRect/>
+          </a:stretch>
+        </p:blipFill>
+        <p:spPr>
+          <a:xfrm>
+            <a:off x="5603958" y="2551423"/>
+            <a:ext cx="2358316" cy="1812009"/>
+          </a:xfrm>
+          <a:prstGeom prst="rect">
+            <a:avLst/>
+          </a:prstGeom>
+        </p:spPr>
+      </p:pic>
+      <p:pic>
+        <p:nvPicPr>
+          <p:cNvPr id="10" name="Picture 9">
+            <a:extLst>
+              <a:ext uri="{FF2B5EF4-FFF2-40B4-BE49-F238E27FC236}">
+                <a16:creationId xmlns:a16="http://schemas.microsoft.com/office/drawing/2014/main" id="{A1F4F965-1F86-41C0-B0F3-D568B944AE2D}"/>
+              </a:ext>
+            </a:extLst>
+          </p:cNvPr>
+          <p:cNvPicPr>
+            <a:picLocks noChangeAspect="1"/>
+          </p:cNvPicPr>
+          <p:nvPr/>
+        </p:nvPicPr>
+        <p:blipFill>
+          <a:blip r:embed="rId5"/>
+          <a:stretch>
+            <a:fillRect/>
+          </a:stretch>
+        </p:blipFill>
+        <p:spPr>
+          <a:xfrm>
+            <a:off x="9276269" y="2544890"/>
+            <a:ext cx="2365525" cy="1812009"/>
+          </a:xfrm>
+          <a:prstGeom prst="rect">
+            <a:avLst/>
+          </a:prstGeom>
+        </p:spPr>
+      </p:pic>
+      <p:pic>
+        <p:nvPicPr>
+          <p:cNvPr id="11" name="Picture 10">
+            <a:extLst>
+              <a:ext uri="{FF2B5EF4-FFF2-40B4-BE49-F238E27FC236}">
+                <a16:creationId xmlns:a16="http://schemas.microsoft.com/office/drawing/2014/main" id="{2AEE128F-2920-4F25-B8A6-706BC42A9127}"/>
+              </a:ext>
+            </a:extLst>
+          </p:cNvPr>
+          <p:cNvPicPr>
+            <a:picLocks noChangeAspect="1"/>
+          </p:cNvPicPr>
+          <p:nvPr/>
+        </p:nvPicPr>
+        <p:blipFill>
+          <a:blip r:embed="rId6"/>
+          <a:stretch>
+            <a:fillRect/>
+          </a:stretch>
+        </p:blipFill>
+        <p:spPr>
+          <a:xfrm>
+            <a:off x="5603958" y="4603207"/>
+            <a:ext cx="2367476" cy="1812009"/>
+          </a:xfrm>
+          <a:prstGeom prst="rect">
+            <a:avLst/>
+          </a:prstGeom>
+        </p:spPr>
+      </p:pic>
+      <p:pic>
+        <p:nvPicPr>
+          <p:cNvPr id="12" name="Picture 11">
+            <a:extLst>
+              <a:ext uri="{FF2B5EF4-FFF2-40B4-BE49-F238E27FC236}">
+                <a16:creationId xmlns:a16="http://schemas.microsoft.com/office/drawing/2014/main" id="{CEFD2F1C-C174-4A1F-9A7E-D2194155FDE5}"/>
+              </a:ext>
+            </a:extLst>
+          </p:cNvPr>
+          <p:cNvPicPr>
+            <a:picLocks noChangeAspect="1"/>
+          </p:cNvPicPr>
+          <p:nvPr/>
+        </p:nvPicPr>
+        <p:blipFill>
+          <a:blip r:embed="rId7"/>
+          <a:stretch>
+            <a:fillRect/>
+          </a:stretch>
+        </p:blipFill>
+        <p:spPr>
+          <a:xfrm>
+            <a:off x="9296397" y="4577079"/>
+            <a:ext cx="2345397" cy="1838137"/>
+          </a:xfrm>
+          <a:prstGeom prst="rect">
+            <a:avLst/>
+          </a:prstGeom>
+        </p:spPr>
+      </p:pic>
+      <p:sp>
+        <p:nvSpPr>
+          <p:cNvPr id="13" name="Oval 12">
+            <a:extLst>
+              <a:ext uri="{FF2B5EF4-FFF2-40B4-BE49-F238E27FC236}">
+                <a16:creationId xmlns:a16="http://schemas.microsoft.com/office/drawing/2014/main" id="{4CB8A4E1-3106-4804-B906-E284C6C3A484}"/>
+              </a:ext>
+            </a:extLst>
+          </p:cNvPr>
+          <p:cNvSpPr/>
+          <p:nvPr/>
+        </p:nvSpPr>
+        <p:spPr>
+          <a:xfrm>
+            <a:off x="5918023" y="5945425"/>
+            <a:ext cx="639531" cy="533751"/>
+          </a:xfrm>
+          <a:prstGeom prst="ellipse">
+            <a:avLst/>
+          </a:prstGeom>
+          <a:noFill/>
+          <a:ln>
+            <a:solidFill>
+              <a:srgbClr val="FF0000"/>
+            </a:solidFill>
+          </a:ln>
+        </p:spPr>
+        <p:style>
+          <a:lnRef idx="2">
+            <a:schemeClr val="accent1">
+              <a:shade val="50000"/>
+            </a:schemeClr>
+          </a:lnRef>
+          <a:fillRef idx="1">
+            <a:schemeClr val="accent1"/>
+          </a:fillRef>
+          <a:effectRef idx="0">
+            <a:schemeClr val="accent1"/>
+          </a:effectRef>
+          <a:fontRef idx="minor">
+            <a:schemeClr val="lt1"/>
+          </a:fontRef>
+        </p:style>
+        <p:txBody>
+          <a:bodyPr rtlCol="0" anchor="ctr"/>
+          <a:lstStyle/>
+          <a:p>
+            <a:pPr algn="ctr"/>
+            <a:endParaRPr lang="en-GB"/>
+          </a:p>
+        </p:txBody>
+      </p:sp>
+    </p:spTree>
+    <p:extLst>
+      <p:ext uri="{BB962C8B-B14F-4D97-AF65-F5344CB8AC3E}">
+        <p14:creationId xmlns:p14="http://schemas.microsoft.com/office/powerpoint/2010/main" val="3581725147"/>
+      </p:ext>
+    </p:extLst>
+  </p:cSld>
+  <p:clrMapOvr>
+    <a:masterClrMapping/>
+  </p:clrMapOvr>
+</p:sld>
+</file>
+
+<file path=ppt/slides/slide5.xml><?xml version="1.0" encoding="utf-8"?>
+<p:sld xmlns:a="http://schemas.openxmlformats.org/drawingml/2006/main" xmlns:r="http://schemas.openxmlformats.org/officeDocument/2006/relationships" xmlns:p="http://schemas.openxmlformats.org/presentationml/2006/main">
+  <p:cSld>
+    <p:spTree>
+      <p:nvGrpSpPr>
+        <p:cNvPr id="1" name=""/>
+        <p:cNvGrpSpPr/>
+        <p:nvPr/>
+      </p:nvGrpSpPr>
+      <p:grpSpPr>
+        <a:xfrm>
+          <a:off x="0" y="0"/>
+          <a:ext cx="0" cy="0"/>
+          <a:chOff x="0" y="0"/>
+          <a:chExt cx="0" cy="0"/>
+        </a:xfrm>
+      </p:grpSpPr>
+      <p:sp>
+        <p:nvSpPr>
+          <p:cNvPr id="2" name="Title 1">
+            <a:extLst>
+              <a:ext uri="{FF2B5EF4-FFF2-40B4-BE49-F238E27FC236}">
+                <a16:creationId xmlns:a16="http://schemas.microsoft.com/office/drawing/2014/main" id="{3789F356-E44F-4E0A-ADE7-8E44244DB16B}"/>
+              </a:ext>
+            </a:extLst>
+          </p:cNvPr>
+          <p:cNvSpPr>
+            <a:spLocks noGrp="1"/>
+          </p:cNvSpPr>
+          <p:nvPr>
+            <p:ph type="title"/>
+          </p:nvPr>
+        </p:nvSpPr>
+        <p:spPr/>
+        <p:txBody>
+          <a:bodyPr/>
+          <a:lstStyle/>
+          <a:p>
+            <a:r>
+              <a:rPr lang="en-GB" sz="3200" dirty="0"/>
+              <a:t>In your summary and analysis, identify any outliers and explain the reasoning for them being outliers and how you believe they should be handled.</a:t>
+            </a:r>
+          </a:p>
+        </p:txBody>
+      </p:sp>
+      <p:sp>
+        <p:nvSpPr>
+          <p:cNvPr id="3" name="Text Placeholder 2">
+            <a:extLst>
+              <a:ext uri="{FF2B5EF4-FFF2-40B4-BE49-F238E27FC236}">
+                <a16:creationId xmlns:a16="http://schemas.microsoft.com/office/drawing/2014/main" id="{F97F4381-00DE-41A2-8E5E-40E559B48B8F}"/>
+              </a:ext>
+            </a:extLst>
+          </p:cNvPr>
+          <p:cNvSpPr>
+            <a:spLocks noGrp="1"/>
+          </p:cNvSpPr>
+          <p:nvPr>
+            <p:ph type="body" sz="half" idx="2"/>
+          </p:nvPr>
+        </p:nvSpPr>
+        <p:spPr/>
+        <p:txBody>
+          <a:bodyPr/>
+          <a:lstStyle/>
+          <a:p>
+            <a:endParaRPr lang="en-GB"/>
+          </a:p>
+        </p:txBody>
+      </p:sp>
+    </p:spTree>
+    <p:extLst>
+      <p:ext uri="{BB962C8B-B14F-4D97-AF65-F5344CB8AC3E}">
+        <p14:creationId xmlns:p14="http://schemas.microsoft.com/office/powerpoint/2010/main" val="213336336"/>
       </p:ext>
     </p:extLst>
   </p:cSld>

</xml_diff>